<commit_message>
Fixed initial solution coverage
</commit_message>
<xml_diff>
--- a/dlx_head.pptx
+++ b/dlx_head.pptx
@@ -105,6 +105,11 @@
       </a:defRPr>
     </a:lvl9pPr>
   </p:defaultTextStyle>
+  <p:extLst>
+    <p:ext uri="{EFAFB233-063F-42B5-8137-9DF3F51BA10A}">
+      <p15:sldGuideLst xmlns:p15="http://schemas.microsoft.com/office/powerpoint/2012/main"/>
+    </p:ext>
+  </p:extLst>
 </p:presentation>
 </file>
 
@@ -255,7 +260,7 @@
           <a:p>
             <a:fld id="{789855E7-8AB2-8A4B-A3DD-00FAF196C84B}" type="datetimeFigureOut">
               <a:rPr lang="en-US" smtClean="0"/>
-              <a:t>12/30/21</a:t>
+              <a:t>1/6/22</a:t>
             </a:fld>
             <a:endParaRPr lang="en-US"/>
           </a:p>
@@ -453,7 +458,7 @@
           <a:p>
             <a:fld id="{789855E7-8AB2-8A4B-A3DD-00FAF196C84B}" type="datetimeFigureOut">
               <a:rPr lang="en-US" smtClean="0"/>
-              <a:t>12/30/21</a:t>
+              <a:t>1/6/22</a:t>
             </a:fld>
             <a:endParaRPr lang="en-US"/>
           </a:p>
@@ -661,7 +666,7 @@
           <a:p>
             <a:fld id="{789855E7-8AB2-8A4B-A3DD-00FAF196C84B}" type="datetimeFigureOut">
               <a:rPr lang="en-US" smtClean="0"/>
-              <a:t>12/30/21</a:t>
+              <a:t>1/6/22</a:t>
             </a:fld>
             <a:endParaRPr lang="en-US"/>
           </a:p>
@@ -859,7 +864,7 @@
           <a:p>
             <a:fld id="{789855E7-8AB2-8A4B-A3DD-00FAF196C84B}" type="datetimeFigureOut">
               <a:rPr lang="en-US" smtClean="0"/>
-              <a:t>12/30/21</a:t>
+              <a:t>1/6/22</a:t>
             </a:fld>
             <a:endParaRPr lang="en-US"/>
           </a:p>
@@ -1134,7 +1139,7 @@
           <a:p>
             <a:fld id="{789855E7-8AB2-8A4B-A3DD-00FAF196C84B}" type="datetimeFigureOut">
               <a:rPr lang="en-US" smtClean="0"/>
-              <a:t>12/30/21</a:t>
+              <a:t>1/6/22</a:t>
             </a:fld>
             <a:endParaRPr lang="en-US"/>
           </a:p>
@@ -1399,7 +1404,7 @@
           <a:p>
             <a:fld id="{789855E7-8AB2-8A4B-A3DD-00FAF196C84B}" type="datetimeFigureOut">
               <a:rPr lang="en-US" smtClean="0"/>
-              <a:t>12/30/21</a:t>
+              <a:t>1/6/22</a:t>
             </a:fld>
             <a:endParaRPr lang="en-US"/>
           </a:p>
@@ -1811,7 +1816,7 @@
           <a:p>
             <a:fld id="{789855E7-8AB2-8A4B-A3DD-00FAF196C84B}" type="datetimeFigureOut">
               <a:rPr lang="en-US" smtClean="0"/>
-              <a:t>12/30/21</a:t>
+              <a:t>1/6/22</a:t>
             </a:fld>
             <a:endParaRPr lang="en-US"/>
           </a:p>
@@ -1952,7 +1957,7 @@
           <a:p>
             <a:fld id="{789855E7-8AB2-8A4B-A3DD-00FAF196C84B}" type="datetimeFigureOut">
               <a:rPr lang="en-US" smtClean="0"/>
-              <a:t>12/30/21</a:t>
+              <a:t>1/6/22</a:t>
             </a:fld>
             <a:endParaRPr lang="en-US"/>
           </a:p>
@@ -2065,7 +2070,7 @@
           <a:p>
             <a:fld id="{789855E7-8AB2-8A4B-A3DD-00FAF196C84B}" type="datetimeFigureOut">
               <a:rPr lang="en-US" smtClean="0"/>
-              <a:t>12/30/21</a:t>
+              <a:t>1/6/22</a:t>
             </a:fld>
             <a:endParaRPr lang="en-US"/>
           </a:p>
@@ -2376,7 +2381,7 @@
           <a:p>
             <a:fld id="{789855E7-8AB2-8A4B-A3DD-00FAF196C84B}" type="datetimeFigureOut">
               <a:rPr lang="en-US" smtClean="0"/>
-              <a:t>12/30/21</a:t>
+              <a:t>1/6/22</a:t>
             </a:fld>
             <a:endParaRPr lang="en-US"/>
           </a:p>
@@ -2664,7 +2669,7 @@
           <a:p>
             <a:fld id="{789855E7-8AB2-8A4B-A3DD-00FAF196C84B}" type="datetimeFigureOut">
               <a:rPr lang="en-US" smtClean="0"/>
-              <a:t>12/30/21</a:t>
+              <a:t>1/6/22</a:t>
             </a:fld>
             <a:endParaRPr lang="en-US"/>
           </a:p>
@@ -2905,7 +2910,7 @@
           <a:p>
             <a:fld id="{789855E7-8AB2-8A4B-A3DD-00FAF196C84B}" type="datetimeFigureOut">
               <a:rPr lang="en-US" smtClean="0"/>
-              <a:t>12/30/21</a:t>
+              <a:t>1/6/22</a:t>
             </a:fld>
             <a:endParaRPr lang="en-US"/>
           </a:p>
@@ -9685,8 +9690,8 @@
         </p:nvSpPr>
         <p:spPr>
           <a:xfrm>
-            <a:off x="6261660" y="837370"/>
-            <a:ext cx="1102738" cy="461665"/>
+            <a:off x="6352070" y="837370"/>
+            <a:ext cx="921920" cy="461665"/>
           </a:xfrm>
           <a:prstGeom prst="rect">
             <a:avLst/>
@@ -9702,7 +9707,7 @@
             <a:pPr algn="ctr"/>
             <a:r>
               <a:rPr lang="en-US" sz="2400" b="1" dirty="0"/>
-              <a:t>Groups</a:t>
+              <a:t>Cages</a:t>
             </a:r>
           </a:p>
         </p:txBody>

</xml_diff>